<commit_message>
IT2: Tkinter: La til chrome-dinosaur-spillet og flere filer fra innspillinger for youtube.
</commit_message>
<xml_diff>
--- a/4_tkinter_grafikk/tkinter_videoundervisning/innspillinger/kollisjonshåndtering.pptx
+++ b/4_tkinter_grafikk/tkinter_videoundervisning/innspillinger/kollisjonshåndtering.pptx
@@ -7,6 +7,7 @@
   <p:sldIdLst>
     <p:sldId id="256" r:id="rId2"/>
     <p:sldId id="257" r:id="rId3"/>
+    <p:sldId id="258" r:id="rId4"/>
   </p:sldIdLst>
   <p:sldSz cx="12192000" cy="6858000"/>
   <p:notesSz cx="6858000" cy="9144000"/>
@@ -3505,7 +3506,7 @@
           <a:p>
             <a:r>
               <a:rPr lang="en-NO" dirty="0"/>
-              <a:t>Er D &lt; 2R har vi kollisjon </a:t>
+              <a:t>Kollisjon når D &lt;= 2R </a:t>
             </a:r>
           </a:p>
         </p:txBody>
@@ -4193,6 +4194,1427 @@
     <p:extLst>
       <p:ext uri="{BB962C8B-B14F-4D97-AF65-F5344CB8AC3E}">
         <p14:creationId xmlns:p14="http://schemas.microsoft.com/office/powerpoint/2010/main" val="70859491"/>
+      </p:ext>
+    </p:extLst>
+  </p:cSld>
+  <p:clrMapOvr>
+    <a:masterClrMapping/>
+  </p:clrMapOvr>
+</p:sld>
+</file>
+
+<file path=ppt/slides/slide3.xml><?xml version="1.0" encoding="utf-8"?>
+<p:sld xmlns:a="http://schemas.openxmlformats.org/drawingml/2006/main" xmlns:r="http://schemas.openxmlformats.org/officeDocument/2006/relationships" xmlns:p="http://schemas.openxmlformats.org/presentationml/2006/main">
+  <p:cSld>
+    <p:spTree>
+      <p:nvGrpSpPr>
+        <p:cNvPr id="1" name=""/>
+        <p:cNvGrpSpPr/>
+        <p:nvPr/>
+      </p:nvGrpSpPr>
+      <p:grpSpPr>
+        <a:xfrm>
+          <a:off x="0" y="0"/>
+          <a:ext cx="0" cy="0"/>
+          <a:chOff x="0" y="0"/>
+          <a:chExt cx="0" cy="0"/>
+        </a:xfrm>
+      </p:grpSpPr>
+      <p:sp>
+        <p:nvSpPr>
+          <p:cNvPr id="2" name="Title 1">
+            <a:extLst>
+              <a:ext uri="{FF2B5EF4-FFF2-40B4-BE49-F238E27FC236}">
+                <a16:creationId xmlns:a16="http://schemas.microsoft.com/office/drawing/2014/main" id="{DA46BF60-EC19-6BCC-7B62-A8ED753ABC63}"/>
+              </a:ext>
+            </a:extLst>
+          </p:cNvPr>
+          <p:cNvSpPr>
+            <a:spLocks noGrp="1"/>
+          </p:cNvSpPr>
+          <p:nvPr>
+            <p:ph type="title"/>
+          </p:nvPr>
+        </p:nvSpPr>
+        <p:spPr/>
+        <p:txBody>
+          <a:bodyPr/>
+          <a:lstStyle/>
+          <a:p>
+            <a:r>
+              <a:rPr lang="en-NO" dirty="0"/>
+              <a:t>Kollisjon mellom to rektangler</a:t>
+            </a:r>
+          </a:p>
+        </p:txBody>
+      </p:sp>
+      <p:sp>
+        <p:nvSpPr>
+          <p:cNvPr id="3" name="Content Placeholder 2">
+            <a:extLst>
+              <a:ext uri="{FF2B5EF4-FFF2-40B4-BE49-F238E27FC236}">
+                <a16:creationId xmlns:a16="http://schemas.microsoft.com/office/drawing/2014/main" id="{3FF320FF-7589-8430-DE04-5BD47BE7CE65}"/>
+              </a:ext>
+            </a:extLst>
+          </p:cNvPr>
+          <p:cNvSpPr>
+            <a:spLocks noGrp="1"/>
+          </p:cNvSpPr>
+          <p:nvPr>
+            <p:ph idx="1"/>
+          </p:nvPr>
+        </p:nvSpPr>
+        <p:spPr>
+          <a:xfrm>
+            <a:off x="838200" y="1825625"/>
+            <a:ext cx="3103179" cy="4351338"/>
+          </a:xfrm>
+        </p:spPr>
+        <p:txBody>
+          <a:bodyPr>
+            <a:normAutofit/>
+          </a:bodyPr>
+          <a:lstStyle/>
+          <a:p>
+            <a:r>
+              <a:rPr lang="en-NO" dirty="0"/>
+              <a:t>Ser på overlapp:</a:t>
+            </a:r>
+          </a:p>
+          <a:p>
+            <a:r>
+              <a:rPr lang="en-NO" dirty="0"/>
+              <a:t>Sjekker om avstand i x-retning er mindre enn l</a:t>
+            </a:r>
+            <a:r>
+              <a:rPr lang="en-NO" baseline="-25000" dirty="0"/>
+              <a:t>1</a:t>
+            </a:r>
+            <a:r>
+              <a:rPr lang="en-NO" dirty="0"/>
+              <a:t>/2 + l</a:t>
+            </a:r>
+            <a:r>
+              <a:rPr lang="en-NO" baseline="-25000" dirty="0"/>
+              <a:t>2</a:t>
+            </a:r>
+            <a:r>
+              <a:rPr lang="en-NO" dirty="0"/>
+              <a:t>/2 </a:t>
+            </a:r>
+          </a:p>
+          <a:p>
+            <a:r>
+              <a:rPr lang="en-NO" dirty="0"/>
+              <a:t>samtidig at avstand i  y-retning er mindre enn h</a:t>
+            </a:r>
+            <a:r>
+              <a:rPr lang="en-NO" baseline="-25000" dirty="0"/>
+              <a:t>1</a:t>
+            </a:r>
+            <a:r>
+              <a:rPr lang="en-NO" dirty="0"/>
+              <a:t>/2 + h</a:t>
+            </a:r>
+            <a:r>
+              <a:rPr lang="en-NO" baseline="-25000" dirty="0"/>
+              <a:t>2</a:t>
+            </a:r>
+            <a:r>
+              <a:rPr lang="en-NO" dirty="0"/>
+              <a:t>/2 </a:t>
+            </a:r>
+          </a:p>
+          <a:p>
+            <a:endParaRPr lang="en-NO" dirty="0"/>
+          </a:p>
+        </p:txBody>
+      </p:sp>
+      <p:grpSp>
+        <p:nvGrpSpPr>
+          <p:cNvPr id="13" name="Group 12">
+            <a:extLst>
+              <a:ext uri="{FF2B5EF4-FFF2-40B4-BE49-F238E27FC236}">
+                <a16:creationId xmlns:a16="http://schemas.microsoft.com/office/drawing/2014/main" id="{DBDD3758-A84F-F7DB-2393-1D616AB403F4}"/>
+              </a:ext>
+            </a:extLst>
+          </p:cNvPr>
+          <p:cNvGrpSpPr/>
+          <p:nvPr/>
+        </p:nvGrpSpPr>
+        <p:grpSpPr>
+          <a:xfrm>
+            <a:off x="7156238" y="2373422"/>
+            <a:ext cx="2578924" cy="1299836"/>
+            <a:chOff x="5303835" y="2273681"/>
+            <a:chExt cx="2578924" cy="1299836"/>
+          </a:xfrm>
+        </p:grpSpPr>
+        <p:cxnSp>
+          <p:nvCxnSpPr>
+            <p:cNvPr id="4" name="Straight Connector 3">
+              <a:extLst>
+                <a:ext uri="{FF2B5EF4-FFF2-40B4-BE49-F238E27FC236}">
+                  <a16:creationId xmlns:a16="http://schemas.microsoft.com/office/drawing/2014/main" id="{470DDFE7-FB3A-C081-47D1-2C8D10781D2C}"/>
+                </a:ext>
+              </a:extLst>
+            </p:cNvPr>
+            <p:cNvCxnSpPr>
+              <a:cxnSpLocks/>
+            </p:cNvCxnSpPr>
+            <p:nvPr/>
+          </p:nvCxnSpPr>
+          <p:spPr>
+            <a:xfrm>
+              <a:off x="5303835" y="2273681"/>
+              <a:ext cx="2578924" cy="0"/>
+            </a:xfrm>
+            <a:prstGeom prst="line">
+              <a:avLst/>
+            </a:prstGeom>
+            <a:ln w="38100">
+              <a:solidFill>
+                <a:schemeClr val="tx2">
+                  <a:lumMod val="75000"/>
+                  <a:lumOff val="25000"/>
+                </a:schemeClr>
+              </a:solidFill>
+            </a:ln>
+          </p:spPr>
+          <p:style>
+            <a:lnRef idx="2">
+              <a:schemeClr val="accent1"/>
+            </a:lnRef>
+            <a:fillRef idx="0">
+              <a:schemeClr val="accent1"/>
+            </a:fillRef>
+            <a:effectRef idx="1">
+              <a:schemeClr val="accent1"/>
+            </a:effectRef>
+            <a:fontRef idx="minor">
+              <a:schemeClr val="tx1"/>
+            </a:fontRef>
+          </p:style>
+        </p:cxnSp>
+        <p:cxnSp>
+          <p:nvCxnSpPr>
+            <p:cNvPr id="6" name="Straight Connector 5">
+              <a:extLst>
+                <a:ext uri="{FF2B5EF4-FFF2-40B4-BE49-F238E27FC236}">
+                  <a16:creationId xmlns:a16="http://schemas.microsoft.com/office/drawing/2014/main" id="{D58BF9DE-E651-C2B2-807F-47DC3F040098}"/>
+                </a:ext>
+              </a:extLst>
+            </p:cNvPr>
+            <p:cNvCxnSpPr>
+              <a:cxnSpLocks/>
+            </p:cNvCxnSpPr>
+            <p:nvPr/>
+          </p:nvCxnSpPr>
+          <p:spPr>
+            <a:xfrm>
+              <a:off x="5303835" y="2273681"/>
+              <a:ext cx="0" cy="1299836"/>
+            </a:xfrm>
+            <a:prstGeom prst="line">
+              <a:avLst/>
+            </a:prstGeom>
+            <a:ln w="38100">
+              <a:solidFill>
+                <a:schemeClr val="tx2">
+                  <a:lumMod val="75000"/>
+                  <a:lumOff val="25000"/>
+                </a:schemeClr>
+              </a:solidFill>
+            </a:ln>
+          </p:spPr>
+          <p:style>
+            <a:lnRef idx="2">
+              <a:schemeClr val="accent1"/>
+            </a:lnRef>
+            <a:fillRef idx="0">
+              <a:schemeClr val="accent1"/>
+            </a:fillRef>
+            <a:effectRef idx="1">
+              <a:schemeClr val="accent1"/>
+            </a:effectRef>
+            <a:fontRef idx="minor">
+              <a:schemeClr val="tx1"/>
+            </a:fontRef>
+          </p:style>
+        </p:cxnSp>
+        <p:cxnSp>
+          <p:nvCxnSpPr>
+            <p:cNvPr id="9" name="Straight Connector 8">
+              <a:extLst>
+                <a:ext uri="{FF2B5EF4-FFF2-40B4-BE49-F238E27FC236}">
+                  <a16:creationId xmlns:a16="http://schemas.microsoft.com/office/drawing/2014/main" id="{A1A3EA20-6915-05CE-E204-533E43AB1D3B}"/>
+                </a:ext>
+              </a:extLst>
+            </p:cNvPr>
+            <p:cNvCxnSpPr>
+              <a:cxnSpLocks/>
+            </p:cNvCxnSpPr>
+            <p:nvPr/>
+          </p:nvCxnSpPr>
+          <p:spPr>
+            <a:xfrm>
+              <a:off x="5303835" y="3573517"/>
+              <a:ext cx="2578924" cy="0"/>
+            </a:xfrm>
+            <a:prstGeom prst="line">
+              <a:avLst/>
+            </a:prstGeom>
+            <a:ln w="38100">
+              <a:solidFill>
+                <a:schemeClr val="tx2">
+                  <a:lumMod val="75000"/>
+                  <a:lumOff val="25000"/>
+                </a:schemeClr>
+              </a:solidFill>
+            </a:ln>
+          </p:spPr>
+          <p:style>
+            <a:lnRef idx="2">
+              <a:schemeClr val="accent1"/>
+            </a:lnRef>
+            <a:fillRef idx="0">
+              <a:schemeClr val="accent1"/>
+            </a:fillRef>
+            <a:effectRef idx="1">
+              <a:schemeClr val="accent1"/>
+            </a:effectRef>
+            <a:fontRef idx="minor">
+              <a:schemeClr val="tx1"/>
+            </a:fontRef>
+          </p:style>
+        </p:cxnSp>
+        <p:cxnSp>
+          <p:nvCxnSpPr>
+            <p:cNvPr id="12" name="Straight Connector 11">
+              <a:extLst>
+                <a:ext uri="{FF2B5EF4-FFF2-40B4-BE49-F238E27FC236}">
+                  <a16:creationId xmlns:a16="http://schemas.microsoft.com/office/drawing/2014/main" id="{F8BC1F3C-8414-9C88-6E74-DED59516A45D}"/>
+                </a:ext>
+              </a:extLst>
+            </p:cNvPr>
+            <p:cNvCxnSpPr>
+              <a:cxnSpLocks/>
+            </p:cNvCxnSpPr>
+            <p:nvPr/>
+          </p:nvCxnSpPr>
+          <p:spPr>
+            <a:xfrm>
+              <a:off x="7882759" y="2273681"/>
+              <a:ext cx="0" cy="1299836"/>
+            </a:xfrm>
+            <a:prstGeom prst="line">
+              <a:avLst/>
+            </a:prstGeom>
+            <a:ln w="38100">
+              <a:solidFill>
+                <a:schemeClr val="tx2">
+                  <a:lumMod val="75000"/>
+                  <a:lumOff val="25000"/>
+                </a:schemeClr>
+              </a:solidFill>
+            </a:ln>
+          </p:spPr>
+          <p:style>
+            <a:lnRef idx="2">
+              <a:schemeClr val="accent1"/>
+            </a:lnRef>
+            <a:fillRef idx="0">
+              <a:schemeClr val="accent1"/>
+            </a:fillRef>
+            <a:effectRef idx="1">
+              <a:schemeClr val="accent1"/>
+            </a:effectRef>
+            <a:fontRef idx="minor">
+              <a:schemeClr val="tx1"/>
+            </a:fontRef>
+          </p:style>
+        </p:cxnSp>
+      </p:grpSp>
+      <p:grpSp>
+        <p:nvGrpSpPr>
+          <p:cNvPr id="14" name="Group 13">
+            <a:extLst>
+              <a:ext uri="{FF2B5EF4-FFF2-40B4-BE49-F238E27FC236}">
+                <a16:creationId xmlns:a16="http://schemas.microsoft.com/office/drawing/2014/main" id="{9D3631EE-FB7D-9CC8-BC48-C598DE260B71}"/>
+              </a:ext>
+            </a:extLst>
+          </p:cNvPr>
+          <p:cNvGrpSpPr/>
+          <p:nvPr/>
+        </p:nvGrpSpPr>
+        <p:grpSpPr>
+          <a:xfrm>
+            <a:off x="5369479" y="3158277"/>
+            <a:ext cx="2578924" cy="1299836"/>
+            <a:chOff x="5303835" y="2273681"/>
+            <a:chExt cx="2578924" cy="1299836"/>
+          </a:xfrm>
+        </p:grpSpPr>
+        <p:cxnSp>
+          <p:nvCxnSpPr>
+            <p:cNvPr id="15" name="Straight Connector 14">
+              <a:extLst>
+                <a:ext uri="{FF2B5EF4-FFF2-40B4-BE49-F238E27FC236}">
+                  <a16:creationId xmlns:a16="http://schemas.microsoft.com/office/drawing/2014/main" id="{4D854832-5261-513E-4803-FFF2FEAEF9AA}"/>
+                </a:ext>
+              </a:extLst>
+            </p:cNvPr>
+            <p:cNvCxnSpPr>
+              <a:cxnSpLocks/>
+            </p:cNvCxnSpPr>
+            <p:nvPr/>
+          </p:nvCxnSpPr>
+          <p:spPr>
+            <a:xfrm>
+              <a:off x="5303835" y="2273681"/>
+              <a:ext cx="2578924" cy="0"/>
+            </a:xfrm>
+            <a:prstGeom prst="line">
+              <a:avLst/>
+            </a:prstGeom>
+            <a:ln w="38100">
+              <a:solidFill>
+                <a:srgbClr val="FF0000"/>
+              </a:solidFill>
+            </a:ln>
+          </p:spPr>
+          <p:style>
+            <a:lnRef idx="2">
+              <a:schemeClr val="accent1"/>
+            </a:lnRef>
+            <a:fillRef idx="0">
+              <a:schemeClr val="accent1"/>
+            </a:fillRef>
+            <a:effectRef idx="1">
+              <a:schemeClr val="accent1"/>
+            </a:effectRef>
+            <a:fontRef idx="minor">
+              <a:schemeClr val="tx1"/>
+            </a:fontRef>
+          </p:style>
+        </p:cxnSp>
+        <p:cxnSp>
+          <p:nvCxnSpPr>
+            <p:cNvPr id="16" name="Straight Connector 15">
+              <a:extLst>
+                <a:ext uri="{FF2B5EF4-FFF2-40B4-BE49-F238E27FC236}">
+                  <a16:creationId xmlns:a16="http://schemas.microsoft.com/office/drawing/2014/main" id="{A33F4924-E770-C6C3-CC15-C58768942562}"/>
+                </a:ext>
+              </a:extLst>
+            </p:cNvPr>
+            <p:cNvCxnSpPr>
+              <a:cxnSpLocks/>
+            </p:cNvCxnSpPr>
+            <p:nvPr/>
+          </p:nvCxnSpPr>
+          <p:spPr>
+            <a:xfrm>
+              <a:off x="5303835" y="2273681"/>
+              <a:ext cx="0" cy="1299836"/>
+            </a:xfrm>
+            <a:prstGeom prst="line">
+              <a:avLst/>
+            </a:prstGeom>
+            <a:ln w="38100">
+              <a:solidFill>
+                <a:srgbClr val="FF0000"/>
+              </a:solidFill>
+            </a:ln>
+          </p:spPr>
+          <p:style>
+            <a:lnRef idx="2">
+              <a:schemeClr val="accent1"/>
+            </a:lnRef>
+            <a:fillRef idx="0">
+              <a:schemeClr val="accent1"/>
+            </a:fillRef>
+            <a:effectRef idx="1">
+              <a:schemeClr val="accent1"/>
+            </a:effectRef>
+            <a:fontRef idx="minor">
+              <a:schemeClr val="tx1"/>
+            </a:fontRef>
+          </p:style>
+        </p:cxnSp>
+        <p:cxnSp>
+          <p:nvCxnSpPr>
+            <p:cNvPr id="17" name="Straight Connector 16">
+              <a:extLst>
+                <a:ext uri="{FF2B5EF4-FFF2-40B4-BE49-F238E27FC236}">
+                  <a16:creationId xmlns:a16="http://schemas.microsoft.com/office/drawing/2014/main" id="{380974EF-93EB-9CC5-F183-59BE69F9F5DC}"/>
+                </a:ext>
+              </a:extLst>
+            </p:cNvPr>
+            <p:cNvCxnSpPr>
+              <a:cxnSpLocks/>
+            </p:cNvCxnSpPr>
+            <p:nvPr/>
+          </p:nvCxnSpPr>
+          <p:spPr>
+            <a:xfrm>
+              <a:off x="5303835" y="3573517"/>
+              <a:ext cx="2578924" cy="0"/>
+            </a:xfrm>
+            <a:prstGeom prst="line">
+              <a:avLst/>
+            </a:prstGeom>
+            <a:ln w="38100">
+              <a:solidFill>
+                <a:srgbClr val="FF0000"/>
+              </a:solidFill>
+            </a:ln>
+          </p:spPr>
+          <p:style>
+            <a:lnRef idx="2">
+              <a:schemeClr val="accent1"/>
+            </a:lnRef>
+            <a:fillRef idx="0">
+              <a:schemeClr val="accent1"/>
+            </a:fillRef>
+            <a:effectRef idx="1">
+              <a:schemeClr val="accent1"/>
+            </a:effectRef>
+            <a:fontRef idx="minor">
+              <a:schemeClr val="tx1"/>
+            </a:fontRef>
+          </p:style>
+        </p:cxnSp>
+        <p:cxnSp>
+          <p:nvCxnSpPr>
+            <p:cNvPr id="18" name="Straight Connector 17">
+              <a:extLst>
+                <a:ext uri="{FF2B5EF4-FFF2-40B4-BE49-F238E27FC236}">
+                  <a16:creationId xmlns:a16="http://schemas.microsoft.com/office/drawing/2014/main" id="{504E9D74-8C4F-13B1-09AD-C88C8FD62A42}"/>
+                </a:ext>
+              </a:extLst>
+            </p:cNvPr>
+            <p:cNvCxnSpPr>
+              <a:cxnSpLocks/>
+            </p:cNvCxnSpPr>
+            <p:nvPr/>
+          </p:nvCxnSpPr>
+          <p:spPr>
+            <a:xfrm>
+              <a:off x="7882759" y="2273681"/>
+              <a:ext cx="0" cy="1299836"/>
+            </a:xfrm>
+            <a:prstGeom prst="line">
+              <a:avLst/>
+            </a:prstGeom>
+            <a:ln w="38100">
+              <a:solidFill>
+                <a:srgbClr val="FF0000"/>
+              </a:solidFill>
+            </a:ln>
+          </p:spPr>
+          <p:style>
+            <a:lnRef idx="2">
+              <a:schemeClr val="accent1"/>
+            </a:lnRef>
+            <a:fillRef idx="0">
+              <a:schemeClr val="accent1"/>
+            </a:fillRef>
+            <a:effectRef idx="1">
+              <a:schemeClr val="accent1"/>
+            </a:effectRef>
+            <a:fontRef idx="minor">
+              <a:schemeClr val="tx1"/>
+            </a:fontRef>
+          </p:style>
+        </p:cxnSp>
+      </p:grpSp>
+      <p:cxnSp>
+        <p:nvCxnSpPr>
+          <p:cNvPr id="20" name="Straight Connector 19">
+            <a:extLst>
+              <a:ext uri="{FF2B5EF4-FFF2-40B4-BE49-F238E27FC236}">
+                <a16:creationId xmlns:a16="http://schemas.microsoft.com/office/drawing/2014/main" id="{90AF5FAF-E421-5429-6343-597A5E71A24A}"/>
+              </a:ext>
+            </a:extLst>
+          </p:cNvPr>
+          <p:cNvCxnSpPr>
+            <a:cxnSpLocks/>
+          </p:cNvCxnSpPr>
+          <p:nvPr/>
+        </p:nvCxnSpPr>
+        <p:spPr>
+          <a:xfrm>
+            <a:off x="7166086" y="3023340"/>
+            <a:ext cx="782317" cy="0"/>
+          </a:xfrm>
+          <a:prstGeom prst="line">
+            <a:avLst/>
+          </a:prstGeom>
+          <a:ln w="12700">
+            <a:solidFill>
+              <a:schemeClr val="tx1"/>
+            </a:solidFill>
+            <a:headEnd type="arrow" w="med" len="med"/>
+            <a:tailEnd type="arrow" w="med" len="med"/>
+          </a:ln>
+        </p:spPr>
+        <p:style>
+          <a:lnRef idx="2">
+            <a:schemeClr val="accent1"/>
+          </a:lnRef>
+          <a:fillRef idx="0">
+            <a:schemeClr val="accent1"/>
+          </a:fillRef>
+          <a:effectRef idx="1">
+            <a:schemeClr val="accent1"/>
+          </a:effectRef>
+          <a:fontRef idx="minor">
+            <a:schemeClr val="tx1"/>
+          </a:fontRef>
+        </p:style>
+      </p:cxnSp>
+      <p:cxnSp>
+        <p:nvCxnSpPr>
+          <p:cNvPr id="25" name="Straight Connector 24">
+            <a:extLst>
+              <a:ext uri="{FF2B5EF4-FFF2-40B4-BE49-F238E27FC236}">
+                <a16:creationId xmlns:a16="http://schemas.microsoft.com/office/drawing/2014/main" id="{EEA11DE0-E7AA-E940-4B7E-D28E0EF79866}"/>
+              </a:ext>
+            </a:extLst>
+          </p:cNvPr>
+          <p:cNvCxnSpPr>
+            <a:cxnSpLocks/>
+          </p:cNvCxnSpPr>
+          <p:nvPr/>
+        </p:nvCxnSpPr>
+        <p:spPr>
+          <a:xfrm flipV="1">
+            <a:off x="8100803" y="3175740"/>
+            <a:ext cx="0" cy="497518"/>
+          </a:xfrm>
+          <a:prstGeom prst="line">
+            <a:avLst/>
+          </a:prstGeom>
+          <a:ln w="12700">
+            <a:solidFill>
+              <a:schemeClr val="tx1"/>
+            </a:solidFill>
+            <a:headEnd type="arrow" w="med" len="med"/>
+            <a:tailEnd type="arrow" w="med" len="med"/>
+          </a:ln>
+        </p:spPr>
+        <p:style>
+          <a:lnRef idx="2">
+            <a:schemeClr val="accent1"/>
+          </a:lnRef>
+          <a:fillRef idx="0">
+            <a:schemeClr val="accent1"/>
+          </a:fillRef>
+          <a:effectRef idx="1">
+            <a:schemeClr val="accent1"/>
+          </a:effectRef>
+          <a:fontRef idx="minor">
+            <a:schemeClr val="tx1"/>
+          </a:fontRef>
+        </p:style>
+      </p:cxnSp>
+      <p:sp>
+        <p:nvSpPr>
+          <p:cNvPr id="28" name="Oval 27">
+            <a:extLst>
+              <a:ext uri="{FF2B5EF4-FFF2-40B4-BE49-F238E27FC236}">
+                <a16:creationId xmlns:a16="http://schemas.microsoft.com/office/drawing/2014/main" id="{51CD2AE3-803B-62A3-C1E8-B66171AE71BD}"/>
+              </a:ext>
+            </a:extLst>
+          </p:cNvPr>
+          <p:cNvSpPr/>
+          <p:nvPr/>
+        </p:nvSpPr>
+        <p:spPr>
+          <a:xfrm>
+            <a:off x="6575191" y="3718195"/>
+            <a:ext cx="180000" cy="180000"/>
+          </a:xfrm>
+          <a:prstGeom prst="ellipse">
+            <a:avLst/>
+          </a:prstGeom>
+        </p:spPr>
+        <p:style>
+          <a:lnRef idx="2">
+            <a:schemeClr val="accent1">
+              <a:shade val="15000"/>
+            </a:schemeClr>
+          </a:lnRef>
+          <a:fillRef idx="1">
+            <a:schemeClr val="accent1"/>
+          </a:fillRef>
+          <a:effectRef idx="0">
+            <a:schemeClr val="accent1"/>
+          </a:effectRef>
+          <a:fontRef idx="minor">
+            <a:schemeClr val="lt1"/>
+          </a:fontRef>
+        </p:style>
+        <p:txBody>
+          <a:bodyPr rtlCol="0" anchor="ctr"/>
+          <a:lstStyle/>
+          <a:p>
+            <a:pPr algn="ctr"/>
+            <a:endParaRPr lang="en-NO"/>
+          </a:p>
+        </p:txBody>
+      </p:sp>
+      <p:sp>
+        <p:nvSpPr>
+          <p:cNvPr id="29" name="Oval 28">
+            <a:extLst>
+              <a:ext uri="{FF2B5EF4-FFF2-40B4-BE49-F238E27FC236}">
+                <a16:creationId xmlns:a16="http://schemas.microsoft.com/office/drawing/2014/main" id="{EA738149-5E97-1921-F559-78A0A812B3CF}"/>
+              </a:ext>
+            </a:extLst>
+          </p:cNvPr>
+          <p:cNvSpPr/>
+          <p:nvPr/>
+        </p:nvSpPr>
+        <p:spPr>
+          <a:xfrm>
+            <a:off x="8355700" y="2928457"/>
+            <a:ext cx="180000" cy="180000"/>
+          </a:xfrm>
+          <a:prstGeom prst="ellipse">
+            <a:avLst/>
+          </a:prstGeom>
+        </p:spPr>
+        <p:style>
+          <a:lnRef idx="2">
+            <a:schemeClr val="accent1">
+              <a:shade val="15000"/>
+            </a:schemeClr>
+          </a:lnRef>
+          <a:fillRef idx="1">
+            <a:schemeClr val="accent1"/>
+          </a:fillRef>
+          <a:effectRef idx="0">
+            <a:schemeClr val="accent1"/>
+          </a:effectRef>
+          <a:fontRef idx="minor">
+            <a:schemeClr val="lt1"/>
+          </a:fontRef>
+        </p:style>
+        <p:txBody>
+          <a:bodyPr rtlCol="0" anchor="ctr"/>
+          <a:lstStyle/>
+          <a:p>
+            <a:pPr algn="ctr"/>
+            <a:endParaRPr lang="en-NO"/>
+          </a:p>
+        </p:txBody>
+      </p:sp>
+      <p:sp>
+        <p:nvSpPr>
+          <p:cNvPr id="30" name="TextBox 29">
+            <a:extLst>
+              <a:ext uri="{FF2B5EF4-FFF2-40B4-BE49-F238E27FC236}">
+                <a16:creationId xmlns:a16="http://schemas.microsoft.com/office/drawing/2014/main" id="{2482EEF2-F3DC-FE15-C081-0960FC5C0E18}"/>
+              </a:ext>
+            </a:extLst>
+          </p:cNvPr>
+          <p:cNvSpPr txBox="1"/>
+          <p:nvPr/>
+        </p:nvSpPr>
+        <p:spPr>
+          <a:xfrm>
+            <a:off x="6247995" y="3916369"/>
+            <a:ext cx="821892" cy="369332"/>
+          </a:xfrm>
+          <a:prstGeom prst="rect">
+            <a:avLst/>
+          </a:prstGeom>
+          <a:noFill/>
+        </p:spPr>
+        <p:txBody>
+          <a:bodyPr wrap="none" rtlCol="0">
+            <a:spAutoFit/>
+          </a:bodyPr>
+          <a:lstStyle/>
+          <a:p>
+            <a:r>
+              <a:rPr lang="en-NO" dirty="0"/>
+              <a:t>(x1,y1)</a:t>
+            </a:r>
+          </a:p>
+        </p:txBody>
+      </p:sp>
+      <p:sp>
+        <p:nvSpPr>
+          <p:cNvPr id="31" name="TextBox 30">
+            <a:extLst>
+              <a:ext uri="{FF2B5EF4-FFF2-40B4-BE49-F238E27FC236}">
+                <a16:creationId xmlns:a16="http://schemas.microsoft.com/office/drawing/2014/main" id="{763E0B35-35F3-2027-17C2-89D2D09F4294}"/>
+              </a:ext>
+            </a:extLst>
+          </p:cNvPr>
+          <p:cNvSpPr txBox="1"/>
+          <p:nvPr/>
+        </p:nvSpPr>
+        <p:spPr>
+          <a:xfrm>
+            <a:off x="8042445" y="2557649"/>
+            <a:ext cx="821892" cy="369332"/>
+          </a:xfrm>
+          <a:prstGeom prst="rect">
+            <a:avLst/>
+          </a:prstGeom>
+          <a:noFill/>
+        </p:spPr>
+        <p:txBody>
+          <a:bodyPr wrap="none" rtlCol="0">
+            <a:spAutoFit/>
+          </a:bodyPr>
+          <a:lstStyle/>
+          <a:p>
+            <a:r>
+              <a:rPr lang="en-NO" dirty="0"/>
+              <a:t>(x2,y2)</a:t>
+            </a:r>
+          </a:p>
+        </p:txBody>
+      </p:sp>
+      <p:grpSp>
+        <p:nvGrpSpPr>
+          <p:cNvPr id="43" name="Group 42">
+            <a:extLst>
+              <a:ext uri="{FF2B5EF4-FFF2-40B4-BE49-F238E27FC236}">
+                <a16:creationId xmlns:a16="http://schemas.microsoft.com/office/drawing/2014/main" id="{731C2C71-1AF4-2EE9-71DC-B61F4A76F867}"/>
+              </a:ext>
+            </a:extLst>
+          </p:cNvPr>
+          <p:cNvGrpSpPr/>
+          <p:nvPr/>
+        </p:nvGrpSpPr>
+        <p:grpSpPr>
+          <a:xfrm>
+            <a:off x="7166086" y="3175740"/>
+            <a:ext cx="782317" cy="485118"/>
+            <a:chOff x="5313683" y="3075999"/>
+            <a:chExt cx="782317" cy="485118"/>
+          </a:xfrm>
+        </p:grpSpPr>
+        <p:cxnSp>
+          <p:nvCxnSpPr>
+            <p:cNvPr id="21" name="Straight Connector 20">
+              <a:extLst>
+                <a:ext uri="{FF2B5EF4-FFF2-40B4-BE49-F238E27FC236}">
+                  <a16:creationId xmlns:a16="http://schemas.microsoft.com/office/drawing/2014/main" id="{71A3DA36-4BC4-22E8-36D4-55BD1D8006DC}"/>
+                </a:ext>
+              </a:extLst>
+            </p:cNvPr>
+            <p:cNvCxnSpPr>
+              <a:cxnSpLocks/>
+            </p:cNvCxnSpPr>
+            <p:nvPr/>
+          </p:nvCxnSpPr>
+          <p:spPr>
+            <a:xfrm flipV="1">
+              <a:off x="5313683" y="3075999"/>
+              <a:ext cx="251917" cy="455256"/>
+            </a:xfrm>
+            <a:prstGeom prst="line">
+              <a:avLst/>
+            </a:prstGeom>
+            <a:ln w="38100">
+              <a:solidFill>
+                <a:schemeClr val="tx1"/>
+              </a:solidFill>
+            </a:ln>
+          </p:spPr>
+          <p:style>
+            <a:lnRef idx="2">
+              <a:schemeClr val="accent1"/>
+            </a:lnRef>
+            <a:fillRef idx="0">
+              <a:schemeClr val="accent1"/>
+            </a:fillRef>
+            <a:effectRef idx="1">
+              <a:schemeClr val="accent1"/>
+            </a:effectRef>
+            <a:fontRef idx="minor">
+              <a:schemeClr val="tx1"/>
+            </a:fontRef>
+          </p:style>
+        </p:cxnSp>
+        <p:cxnSp>
+          <p:nvCxnSpPr>
+            <p:cNvPr id="34" name="Straight Connector 33">
+              <a:extLst>
+                <a:ext uri="{FF2B5EF4-FFF2-40B4-BE49-F238E27FC236}">
+                  <a16:creationId xmlns:a16="http://schemas.microsoft.com/office/drawing/2014/main" id="{94AA2C92-01E9-D444-1F66-734C432EFF9E}"/>
+                </a:ext>
+              </a:extLst>
+            </p:cNvPr>
+            <p:cNvCxnSpPr>
+              <a:cxnSpLocks/>
+            </p:cNvCxnSpPr>
+            <p:nvPr/>
+          </p:nvCxnSpPr>
+          <p:spPr>
+            <a:xfrm flipV="1">
+              <a:off x="5456235" y="3093461"/>
+              <a:ext cx="251917" cy="455256"/>
+            </a:xfrm>
+            <a:prstGeom prst="line">
+              <a:avLst/>
+            </a:prstGeom>
+            <a:ln w="38100">
+              <a:solidFill>
+                <a:schemeClr val="tx1"/>
+              </a:solidFill>
+            </a:ln>
+          </p:spPr>
+          <p:style>
+            <a:lnRef idx="2">
+              <a:schemeClr val="accent1"/>
+            </a:lnRef>
+            <a:fillRef idx="0">
+              <a:schemeClr val="accent1"/>
+            </a:fillRef>
+            <a:effectRef idx="1">
+              <a:schemeClr val="accent1"/>
+            </a:effectRef>
+            <a:fontRef idx="minor">
+              <a:schemeClr val="tx1"/>
+            </a:fontRef>
+          </p:style>
+        </p:cxnSp>
+        <p:cxnSp>
+          <p:nvCxnSpPr>
+            <p:cNvPr id="35" name="Straight Connector 34">
+              <a:extLst>
+                <a:ext uri="{FF2B5EF4-FFF2-40B4-BE49-F238E27FC236}">
+                  <a16:creationId xmlns:a16="http://schemas.microsoft.com/office/drawing/2014/main" id="{A0B8E81A-6E1B-0716-8E16-9866E1D79DF9}"/>
+                </a:ext>
+              </a:extLst>
+            </p:cNvPr>
+            <p:cNvCxnSpPr>
+              <a:cxnSpLocks/>
+            </p:cNvCxnSpPr>
+            <p:nvPr/>
+          </p:nvCxnSpPr>
+          <p:spPr>
+            <a:xfrm flipV="1">
+              <a:off x="5613962" y="3095399"/>
+              <a:ext cx="251917" cy="455256"/>
+            </a:xfrm>
+            <a:prstGeom prst="line">
+              <a:avLst/>
+            </a:prstGeom>
+            <a:ln w="38100">
+              <a:solidFill>
+                <a:schemeClr val="tx1"/>
+              </a:solidFill>
+            </a:ln>
+          </p:spPr>
+          <p:style>
+            <a:lnRef idx="2">
+              <a:schemeClr val="accent1"/>
+            </a:lnRef>
+            <a:fillRef idx="0">
+              <a:schemeClr val="accent1"/>
+            </a:fillRef>
+            <a:effectRef idx="1">
+              <a:schemeClr val="accent1"/>
+            </a:effectRef>
+            <a:fontRef idx="minor">
+              <a:schemeClr val="tx1"/>
+            </a:fontRef>
+          </p:style>
+        </p:cxnSp>
+        <p:cxnSp>
+          <p:nvCxnSpPr>
+            <p:cNvPr id="36" name="Straight Connector 35">
+              <a:extLst>
+                <a:ext uri="{FF2B5EF4-FFF2-40B4-BE49-F238E27FC236}">
+                  <a16:creationId xmlns:a16="http://schemas.microsoft.com/office/drawing/2014/main" id="{A428D9B3-6612-8B7D-74E6-D1973CD2972C}"/>
+                </a:ext>
+              </a:extLst>
+            </p:cNvPr>
+            <p:cNvCxnSpPr>
+              <a:cxnSpLocks/>
+            </p:cNvCxnSpPr>
+            <p:nvPr/>
+          </p:nvCxnSpPr>
+          <p:spPr>
+            <a:xfrm flipV="1">
+              <a:off x="5767530" y="3097599"/>
+              <a:ext cx="251917" cy="455256"/>
+            </a:xfrm>
+            <a:prstGeom prst="line">
+              <a:avLst/>
+            </a:prstGeom>
+            <a:ln w="38100">
+              <a:solidFill>
+                <a:schemeClr val="tx1"/>
+              </a:solidFill>
+            </a:ln>
+          </p:spPr>
+          <p:style>
+            <a:lnRef idx="2">
+              <a:schemeClr val="accent1"/>
+            </a:lnRef>
+            <a:fillRef idx="0">
+              <a:schemeClr val="accent1"/>
+            </a:fillRef>
+            <a:effectRef idx="1">
+              <a:schemeClr val="accent1"/>
+            </a:effectRef>
+            <a:fontRef idx="minor">
+              <a:schemeClr val="tx1"/>
+            </a:fontRef>
+          </p:style>
+        </p:cxnSp>
+        <p:cxnSp>
+          <p:nvCxnSpPr>
+            <p:cNvPr id="37" name="Straight Connector 36">
+              <a:extLst>
+                <a:ext uri="{FF2B5EF4-FFF2-40B4-BE49-F238E27FC236}">
+                  <a16:creationId xmlns:a16="http://schemas.microsoft.com/office/drawing/2014/main" id="{B7758909-531E-70BF-CBD7-783EB20C2D22}"/>
+                </a:ext>
+              </a:extLst>
+            </p:cNvPr>
+            <p:cNvCxnSpPr>
+              <a:cxnSpLocks/>
+            </p:cNvCxnSpPr>
+            <p:nvPr/>
+          </p:nvCxnSpPr>
+          <p:spPr>
+            <a:xfrm flipV="1">
+              <a:off x="5904247" y="3193473"/>
+              <a:ext cx="191753" cy="367644"/>
+            </a:xfrm>
+            <a:prstGeom prst="line">
+              <a:avLst/>
+            </a:prstGeom>
+            <a:ln w="38100">
+              <a:solidFill>
+                <a:schemeClr val="tx1"/>
+              </a:solidFill>
+            </a:ln>
+          </p:spPr>
+          <p:style>
+            <a:lnRef idx="2">
+              <a:schemeClr val="accent1"/>
+            </a:lnRef>
+            <a:fillRef idx="0">
+              <a:schemeClr val="accent1"/>
+            </a:fillRef>
+            <a:effectRef idx="1">
+              <a:schemeClr val="accent1"/>
+            </a:effectRef>
+            <a:fontRef idx="minor">
+              <a:schemeClr val="tx1"/>
+            </a:fontRef>
+          </p:style>
+        </p:cxnSp>
+        <p:cxnSp>
+          <p:nvCxnSpPr>
+            <p:cNvPr id="40" name="Straight Connector 39">
+              <a:extLst>
+                <a:ext uri="{FF2B5EF4-FFF2-40B4-BE49-F238E27FC236}">
+                  <a16:creationId xmlns:a16="http://schemas.microsoft.com/office/drawing/2014/main" id="{1844B980-423F-4E9C-022C-D75DEC14809E}"/>
+                </a:ext>
+              </a:extLst>
+            </p:cNvPr>
+            <p:cNvCxnSpPr>
+              <a:cxnSpLocks/>
+            </p:cNvCxnSpPr>
+            <p:nvPr/>
+          </p:nvCxnSpPr>
+          <p:spPr>
+            <a:xfrm flipV="1">
+              <a:off x="5316092" y="3075999"/>
+              <a:ext cx="130296" cy="235907"/>
+            </a:xfrm>
+            <a:prstGeom prst="line">
+              <a:avLst/>
+            </a:prstGeom>
+            <a:ln w="38100">
+              <a:solidFill>
+                <a:schemeClr val="tx1"/>
+              </a:solidFill>
+            </a:ln>
+          </p:spPr>
+          <p:style>
+            <a:lnRef idx="2">
+              <a:schemeClr val="accent1"/>
+            </a:lnRef>
+            <a:fillRef idx="0">
+              <a:schemeClr val="accent1"/>
+            </a:fillRef>
+            <a:effectRef idx="1">
+              <a:schemeClr val="accent1"/>
+            </a:effectRef>
+            <a:fontRef idx="minor">
+              <a:schemeClr val="tx1"/>
+            </a:fontRef>
+          </p:style>
+        </p:cxnSp>
+      </p:grpSp>
+      <p:cxnSp>
+        <p:nvCxnSpPr>
+          <p:cNvPr id="44" name="Straight Connector 43">
+            <a:extLst>
+              <a:ext uri="{FF2B5EF4-FFF2-40B4-BE49-F238E27FC236}">
+                <a16:creationId xmlns:a16="http://schemas.microsoft.com/office/drawing/2014/main" id="{2618A4C6-8DE1-A7DA-BFD9-CB65DFBD9FC7}"/>
+              </a:ext>
+            </a:extLst>
+          </p:cNvPr>
+          <p:cNvCxnSpPr>
+            <a:cxnSpLocks/>
+          </p:cNvCxnSpPr>
+          <p:nvPr/>
+        </p:nvCxnSpPr>
+        <p:spPr>
+          <a:xfrm>
+            <a:off x="6673678" y="4614795"/>
+            <a:ext cx="1274725" cy="0"/>
+          </a:xfrm>
+          <a:prstGeom prst="line">
+            <a:avLst/>
+          </a:prstGeom>
+          <a:ln w="12700">
+            <a:solidFill>
+              <a:schemeClr val="tx1"/>
+            </a:solidFill>
+            <a:headEnd type="arrow" w="med" len="med"/>
+            <a:tailEnd type="arrow" w="med" len="med"/>
+          </a:ln>
+        </p:spPr>
+        <p:style>
+          <a:lnRef idx="2">
+            <a:schemeClr val="accent1"/>
+          </a:lnRef>
+          <a:fillRef idx="0">
+            <a:schemeClr val="accent1"/>
+          </a:fillRef>
+          <a:effectRef idx="1">
+            <a:schemeClr val="accent1"/>
+          </a:effectRef>
+          <a:fontRef idx="minor">
+            <a:schemeClr val="tx1"/>
+          </a:fontRef>
+        </p:style>
+      </p:cxnSp>
+      <p:cxnSp>
+        <p:nvCxnSpPr>
+          <p:cNvPr id="46" name="Straight Connector 45">
+            <a:extLst>
+              <a:ext uri="{FF2B5EF4-FFF2-40B4-BE49-F238E27FC236}">
+                <a16:creationId xmlns:a16="http://schemas.microsoft.com/office/drawing/2014/main" id="{B1DD0A3D-C235-A485-89E5-41FF7807679E}"/>
+              </a:ext>
+            </a:extLst>
+          </p:cNvPr>
+          <p:cNvCxnSpPr>
+            <a:cxnSpLocks/>
+          </p:cNvCxnSpPr>
+          <p:nvPr/>
+        </p:nvCxnSpPr>
+        <p:spPr>
+          <a:xfrm>
+            <a:off x="7108528" y="2173896"/>
+            <a:ext cx="1274725" cy="0"/>
+          </a:xfrm>
+          <a:prstGeom prst="line">
+            <a:avLst/>
+          </a:prstGeom>
+          <a:ln w="12700">
+            <a:solidFill>
+              <a:schemeClr val="tx1"/>
+            </a:solidFill>
+            <a:headEnd type="arrow" w="med" len="med"/>
+            <a:tailEnd type="arrow" w="med" len="med"/>
+          </a:ln>
+        </p:spPr>
+        <p:style>
+          <a:lnRef idx="2">
+            <a:schemeClr val="accent1"/>
+          </a:lnRef>
+          <a:fillRef idx="0">
+            <a:schemeClr val="accent1"/>
+          </a:fillRef>
+          <a:effectRef idx="1">
+            <a:schemeClr val="accent1"/>
+          </a:effectRef>
+          <a:fontRef idx="minor">
+            <a:schemeClr val="tx1"/>
+          </a:fontRef>
+        </p:style>
+      </p:cxnSp>
+      <p:sp>
+        <p:nvSpPr>
+          <p:cNvPr id="47" name="TextBox 46">
+            <a:extLst>
+              <a:ext uri="{FF2B5EF4-FFF2-40B4-BE49-F238E27FC236}">
+                <a16:creationId xmlns:a16="http://schemas.microsoft.com/office/drawing/2014/main" id="{FEF53A1C-1F95-4ED2-34FD-26DF07912710}"/>
+              </a:ext>
+            </a:extLst>
+          </p:cNvPr>
+          <p:cNvSpPr txBox="1"/>
+          <p:nvPr/>
+        </p:nvSpPr>
+        <p:spPr>
+          <a:xfrm>
+            <a:off x="7278911" y="1825625"/>
+            <a:ext cx="527709" cy="369332"/>
+          </a:xfrm>
+          <a:prstGeom prst="rect">
+            <a:avLst/>
+          </a:prstGeom>
+          <a:noFill/>
+        </p:spPr>
+        <p:txBody>
+          <a:bodyPr wrap="none" rtlCol="0">
+            <a:spAutoFit/>
+          </a:bodyPr>
+          <a:lstStyle/>
+          <a:p>
+            <a:r>
+              <a:rPr lang="en-NO" dirty="0"/>
+              <a:t>l</a:t>
+            </a:r>
+            <a:r>
+              <a:rPr lang="en-NO" baseline="-25000" dirty="0"/>
+              <a:t>2</a:t>
+            </a:r>
+            <a:r>
+              <a:rPr lang="en-NO" dirty="0"/>
+              <a:t>/2</a:t>
+            </a:r>
+          </a:p>
+        </p:txBody>
+      </p:sp>
+      <p:sp>
+        <p:nvSpPr>
+          <p:cNvPr id="48" name="TextBox 47">
+            <a:extLst>
+              <a:ext uri="{FF2B5EF4-FFF2-40B4-BE49-F238E27FC236}">
+                <a16:creationId xmlns:a16="http://schemas.microsoft.com/office/drawing/2014/main" id="{5AC7F048-0C6E-0F50-E3F0-1F8247F024E9}"/>
+              </a:ext>
+            </a:extLst>
+          </p:cNvPr>
+          <p:cNvSpPr txBox="1"/>
+          <p:nvPr/>
+        </p:nvSpPr>
+        <p:spPr>
+          <a:xfrm>
+            <a:off x="7018678" y="4614795"/>
+            <a:ext cx="527709" cy="369332"/>
+          </a:xfrm>
+          <a:prstGeom prst="rect">
+            <a:avLst/>
+          </a:prstGeom>
+          <a:noFill/>
+        </p:spPr>
+        <p:txBody>
+          <a:bodyPr wrap="none" rtlCol="0">
+            <a:spAutoFit/>
+          </a:bodyPr>
+          <a:lstStyle/>
+          <a:p>
+            <a:r>
+              <a:rPr lang="en-NO" dirty="0"/>
+              <a:t>l</a:t>
+            </a:r>
+            <a:r>
+              <a:rPr lang="en-NO" baseline="-25000" dirty="0"/>
+              <a:t>1</a:t>
+            </a:r>
+            <a:r>
+              <a:rPr lang="en-NO" dirty="0"/>
+              <a:t>/2</a:t>
+            </a:r>
+          </a:p>
+        </p:txBody>
+      </p:sp>
+      <p:cxnSp>
+        <p:nvCxnSpPr>
+          <p:cNvPr id="49" name="Straight Connector 48">
+            <a:extLst>
+              <a:ext uri="{FF2B5EF4-FFF2-40B4-BE49-F238E27FC236}">
+                <a16:creationId xmlns:a16="http://schemas.microsoft.com/office/drawing/2014/main" id="{9B98A67E-1BFA-8F02-A247-319D29F4B9E9}"/>
+              </a:ext>
+            </a:extLst>
+          </p:cNvPr>
+          <p:cNvCxnSpPr>
+            <a:cxnSpLocks/>
+          </p:cNvCxnSpPr>
+          <p:nvPr/>
+        </p:nvCxnSpPr>
+        <p:spPr>
+          <a:xfrm>
+            <a:off x="9841960" y="2985654"/>
+            <a:ext cx="0" cy="683290"/>
+          </a:xfrm>
+          <a:prstGeom prst="line">
+            <a:avLst/>
+          </a:prstGeom>
+          <a:ln w="12700">
+            <a:solidFill>
+              <a:schemeClr val="tx1"/>
+            </a:solidFill>
+            <a:headEnd type="arrow" w="med" len="med"/>
+            <a:tailEnd type="arrow" w="med" len="med"/>
+          </a:ln>
+        </p:spPr>
+        <p:style>
+          <a:lnRef idx="2">
+            <a:schemeClr val="accent1"/>
+          </a:lnRef>
+          <a:fillRef idx="0">
+            <a:schemeClr val="accent1"/>
+          </a:fillRef>
+          <a:effectRef idx="1">
+            <a:schemeClr val="accent1"/>
+          </a:effectRef>
+          <a:fontRef idx="minor">
+            <a:schemeClr val="tx1"/>
+          </a:fontRef>
+        </p:style>
+      </p:cxnSp>
+      <p:sp>
+        <p:nvSpPr>
+          <p:cNvPr id="50" name="TextBox 49">
+            <a:extLst>
+              <a:ext uri="{FF2B5EF4-FFF2-40B4-BE49-F238E27FC236}">
+                <a16:creationId xmlns:a16="http://schemas.microsoft.com/office/drawing/2014/main" id="{CAE4D3A5-1DB6-C18D-ED60-9B746FE7CB9D}"/>
+              </a:ext>
+            </a:extLst>
+          </p:cNvPr>
+          <p:cNvSpPr txBox="1"/>
+          <p:nvPr/>
+        </p:nvSpPr>
+        <p:spPr>
+          <a:xfrm>
+            <a:off x="9841960" y="3159409"/>
+            <a:ext cx="595035" cy="369332"/>
+          </a:xfrm>
+          <a:prstGeom prst="rect">
+            <a:avLst/>
+          </a:prstGeom>
+          <a:noFill/>
+        </p:spPr>
+        <p:txBody>
+          <a:bodyPr wrap="none" rtlCol="0">
+            <a:spAutoFit/>
+          </a:bodyPr>
+          <a:lstStyle/>
+          <a:p>
+            <a:r>
+              <a:rPr lang="en-NO" dirty="0"/>
+              <a:t>h</a:t>
+            </a:r>
+            <a:r>
+              <a:rPr lang="en-NO" baseline="-25000" dirty="0"/>
+              <a:t>2</a:t>
+            </a:r>
+            <a:r>
+              <a:rPr lang="en-NO" dirty="0"/>
+              <a:t>/2</a:t>
+            </a:r>
+          </a:p>
+        </p:txBody>
+      </p:sp>
+      <p:cxnSp>
+        <p:nvCxnSpPr>
+          <p:cNvPr id="54" name="Straight Connector 53">
+            <a:extLst>
+              <a:ext uri="{FF2B5EF4-FFF2-40B4-BE49-F238E27FC236}">
+                <a16:creationId xmlns:a16="http://schemas.microsoft.com/office/drawing/2014/main" id="{4174BE99-8F1F-C460-CBCB-C4FA684D862C}"/>
+              </a:ext>
+            </a:extLst>
+          </p:cNvPr>
+          <p:cNvCxnSpPr>
+            <a:cxnSpLocks/>
+          </p:cNvCxnSpPr>
+          <p:nvPr/>
+        </p:nvCxnSpPr>
+        <p:spPr>
+          <a:xfrm flipH="1">
+            <a:off x="5178377" y="3158277"/>
+            <a:ext cx="5845" cy="660453"/>
+          </a:xfrm>
+          <a:prstGeom prst="line">
+            <a:avLst/>
+          </a:prstGeom>
+          <a:ln w="12700">
+            <a:solidFill>
+              <a:schemeClr val="tx1"/>
+            </a:solidFill>
+            <a:headEnd type="arrow" w="med" len="med"/>
+            <a:tailEnd type="arrow" w="med" len="med"/>
+          </a:ln>
+        </p:spPr>
+        <p:style>
+          <a:lnRef idx="2">
+            <a:schemeClr val="accent1"/>
+          </a:lnRef>
+          <a:fillRef idx="0">
+            <a:schemeClr val="accent1"/>
+          </a:fillRef>
+          <a:effectRef idx="1">
+            <a:schemeClr val="accent1"/>
+          </a:effectRef>
+          <a:fontRef idx="minor">
+            <a:schemeClr val="tx1"/>
+          </a:fontRef>
+        </p:style>
+      </p:cxnSp>
+      <p:sp>
+        <p:nvSpPr>
+          <p:cNvPr id="55" name="TextBox 54">
+            <a:extLst>
+              <a:ext uri="{FF2B5EF4-FFF2-40B4-BE49-F238E27FC236}">
+                <a16:creationId xmlns:a16="http://schemas.microsoft.com/office/drawing/2014/main" id="{1429FC68-D27C-4534-F209-A31497E4DEBC}"/>
+              </a:ext>
+            </a:extLst>
+          </p:cNvPr>
+          <p:cNvSpPr txBox="1"/>
+          <p:nvPr/>
+        </p:nvSpPr>
+        <p:spPr>
+          <a:xfrm>
+            <a:off x="4616717" y="3279126"/>
+            <a:ext cx="595035" cy="369332"/>
+          </a:xfrm>
+          <a:prstGeom prst="rect">
+            <a:avLst/>
+          </a:prstGeom>
+          <a:noFill/>
+        </p:spPr>
+        <p:txBody>
+          <a:bodyPr wrap="none" rtlCol="0">
+            <a:spAutoFit/>
+          </a:bodyPr>
+          <a:lstStyle/>
+          <a:p>
+            <a:r>
+              <a:rPr lang="en-NO" dirty="0"/>
+              <a:t>h</a:t>
+            </a:r>
+            <a:r>
+              <a:rPr lang="en-NO" baseline="-25000" dirty="0"/>
+              <a:t>1</a:t>
+            </a:r>
+            <a:r>
+              <a:rPr lang="en-NO" dirty="0"/>
+              <a:t>/2</a:t>
+            </a:r>
+          </a:p>
+        </p:txBody>
+      </p:sp>
+    </p:spTree>
+    <p:extLst>
+      <p:ext uri="{BB962C8B-B14F-4D97-AF65-F5344CB8AC3E}">
+        <p14:creationId xmlns:p14="http://schemas.microsoft.com/office/powerpoint/2010/main" val="6331970"/>
       </p:ext>
     </p:extLst>
   </p:cSld>

</xml_diff>